<commit_message>
TW edits for diagram and bullets
</commit_message>
<xml_diff>
--- a/docs/deployment_guide/images/aws_cfn_soci_index_builder_architecture_diagram.pptx
+++ b/docs/deployment_guide/images/aws_cfn_soci_index_builder_architecture_diagram.pptx
@@ -259,7 +259,7 @@
           <a:p>
             <a:fld id="{EDE264CC-01BA-AE49-9E00-875A24F61083}" type="datetimeFigureOut">
               <a:rPr lang="en-US" smtClean="0"/>
-              <a:t>2/24/23</a:t>
+              <a:t>3/1/2023</a:t>
             </a:fld>
             <a:endParaRPr lang="en-US"/>
           </a:p>
@@ -457,7 +457,7 @@
           <a:p>
             <a:fld id="{EDE264CC-01BA-AE49-9E00-875A24F61083}" type="datetimeFigureOut">
               <a:rPr lang="en-US" smtClean="0"/>
-              <a:t>2/24/23</a:t>
+              <a:t>3/1/2023</a:t>
             </a:fld>
             <a:endParaRPr lang="en-US"/>
           </a:p>
@@ -665,7 +665,7 @@
           <a:p>
             <a:fld id="{EDE264CC-01BA-AE49-9E00-875A24F61083}" type="datetimeFigureOut">
               <a:rPr lang="en-US" smtClean="0"/>
-              <a:t>2/24/23</a:t>
+              <a:t>3/1/2023</a:t>
             </a:fld>
             <a:endParaRPr lang="en-US"/>
           </a:p>
@@ -863,7 +863,7 @@
           <a:p>
             <a:fld id="{EDE264CC-01BA-AE49-9E00-875A24F61083}" type="datetimeFigureOut">
               <a:rPr lang="en-US" smtClean="0"/>
-              <a:t>2/24/23</a:t>
+              <a:t>3/1/2023</a:t>
             </a:fld>
             <a:endParaRPr lang="en-US"/>
           </a:p>
@@ -1138,7 +1138,7 @@
           <a:p>
             <a:fld id="{EDE264CC-01BA-AE49-9E00-875A24F61083}" type="datetimeFigureOut">
               <a:rPr lang="en-US" smtClean="0"/>
-              <a:t>2/24/23</a:t>
+              <a:t>3/1/2023</a:t>
             </a:fld>
             <a:endParaRPr lang="en-US"/>
           </a:p>
@@ -1403,7 +1403,7 @@
           <a:p>
             <a:fld id="{EDE264CC-01BA-AE49-9E00-875A24F61083}" type="datetimeFigureOut">
               <a:rPr lang="en-US" smtClean="0"/>
-              <a:t>2/24/23</a:t>
+              <a:t>3/1/2023</a:t>
             </a:fld>
             <a:endParaRPr lang="en-US"/>
           </a:p>
@@ -1815,7 +1815,7 @@
           <a:p>
             <a:fld id="{EDE264CC-01BA-AE49-9E00-875A24F61083}" type="datetimeFigureOut">
               <a:rPr lang="en-US" smtClean="0"/>
-              <a:t>2/24/23</a:t>
+              <a:t>3/1/2023</a:t>
             </a:fld>
             <a:endParaRPr lang="en-US"/>
           </a:p>
@@ -1956,7 +1956,7 @@
           <a:p>
             <a:fld id="{EDE264CC-01BA-AE49-9E00-875A24F61083}" type="datetimeFigureOut">
               <a:rPr lang="en-US" smtClean="0"/>
-              <a:t>2/24/23</a:t>
+              <a:t>3/1/2023</a:t>
             </a:fld>
             <a:endParaRPr lang="en-US"/>
           </a:p>
@@ -2069,7 +2069,7 @@
           <a:p>
             <a:fld id="{EDE264CC-01BA-AE49-9E00-875A24F61083}" type="datetimeFigureOut">
               <a:rPr lang="en-US" smtClean="0"/>
-              <a:t>2/24/23</a:t>
+              <a:t>3/1/2023</a:t>
             </a:fld>
             <a:endParaRPr lang="en-US"/>
           </a:p>
@@ -2380,7 +2380,7 @@
           <a:p>
             <a:fld id="{EDE264CC-01BA-AE49-9E00-875A24F61083}" type="datetimeFigureOut">
               <a:rPr lang="en-US" smtClean="0"/>
-              <a:t>2/24/23</a:t>
+              <a:t>3/1/2023</a:t>
             </a:fld>
             <a:endParaRPr lang="en-US"/>
           </a:p>
@@ -2668,7 +2668,7 @@
           <a:p>
             <a:fld id="{EDE264CC-01BA-AE49-9E00-875A24F61083}" type="datetimeFigureOut">
               <a:rPr lang="en-US" smtClean="0"/>
-              <a:t>2/24/23</a:t>
+              <a:t>3/1/2023</a:t>
             </a:fld>
             <a:endParaRPr lang="en-US"/>
           </a:p>
@@ -2909,7 +2909,7 @@
           <a:p>
             <a:fld id="{EDE264CC-01BA-AE49-9E00-875A24F61083}" type="datetimeFigureOut">
               <a:rPr lang="en-US" smtClean="0"/>
-              <a:t>2/24/23</a:t>
+              <a:t>3/1/2023</a:t>
             </a:fld>
             <a:endParaRPr lang="en-US"/>
           </a:p>
@@ -3353,8 +3353,8 @@
         </p:blipFill>
         <p:spPr bwMode="auto">
           <a:xfrm>
-            <a:off x="620414" y="3069764"/>
-            <a:ext cx="761999" cy="761999"/>
+            <a:off x="159771" y="2135500"/>
+            <a:ext cx="466344" cy="466344"/>
           </a:xfrm>
           <a:prstGeom prst="rect">
             <a:avLst/>
@@ -3395,13 +3395,15 @@
           </p:cNvPr>
           <p:cNvCxnSpPr>
             <a:cxnSpLocks/>
+            <a:stCxn id="20" idx="3"/>
+            <a:endCxn id="13" idx="1"/>
           </p:cNvCxnSpPr>
           <p:nvPr/>
         </p:nvCxnSpPr>
         <p:spPr>
           <a:xfrm>
-            <a:off x="5678834" y="3439881"/>
-            <a:ext cx="1158889" cy="0"/>
+            <a:off x="2816352" y="2368296"/>
+            <a:ext cx="640080" cy="0"/>
           </a:xfrm>
           <a:prstGeom prst="straightConnector1">
             <a:avLst/>
@@ -3440,13 +3442,15 @@
           </p:cNvPr>
           <p:cNvCxnSpPr>
             <a:cxnSpLocks/>
+            <a:stCxn id="13" idx="3"/>
+            <a:endCxn id="19" idx="1"/>
           </p:cNvCxnSpPr>
           <p:nvPr/>
         </p:nvCxnSpPr>
         <p:spPr>
           <a:xfrm>
-            <a:off x="7599723" y="3439881"/>
-            <a:ext cx="1140750" cy="0"/>
+            <a:off x="3913632" y="2368296"/>
+            <a:ext cx="640080" cy="0"/>
           </a:xfrm>
           <a:prstGeom prst="straightConnector1">
             <a:avLst/>
@@ -3485,13 +3489,15 @@
           </p:cNvPr>
           <p:cNvCxnSpPr>
             <a:cxnSpLocks/>
+            <a:stCxn id="17" idx="3"/>
+            <a:endCxn id="31" idx="1"/>
           </p:cNvCxnSpPr>
           <p:nvPr/>
         </p:nvCxnSpPr>
         <p:spPr>
           <a:xfrm>
-            <a:off x="1505119" y="3450765"/>
-            <a:ext cx="1076240" cy="0"/>
+            <a:off x="626115" y="2368672"/>
+            <a:ext cx="635757" cy="0"/>
           </a:xfrm>
           <a:prstGeom prst="straightConnector1">
             <a:avLst/>
@@ -3533,8 +3539,8 @@
         </p:nvSpPr>
         <p:spPr>
           <a:xfrm>
-            <a:off x="739963" y="3846081"/>
-            <a:ext cx="522900" cy="307777"/>
+            <a:off x="152527" y="2560320"/>
+            <a:ext cx="482824" cy="261610"/>
           </a:xfrm>
           <a:prstGeom prst="rect">
             <a:avLst/>
@@ -3549,7 +3555,10 @@
           <a:p>
             <a:pPr algn="ctr"/>
             <a:r>
-              <a:rPr lang="en-US" sz="1400" dirty="0"/>
+              <a:rPr lang="en-US" sz="1100" dirty="0">
+                <a:latin typeface="Arial" panose="020B0604020202020204" pitchFamily="34" charset="0"/>
+                <a:cs typeface="Arial" panose="020B0604020202020204" pitchFamily="34" charset="0"/>
+              </a:rPr>
               <a:t>User</a:t>
             </a:r>
           </a:p>
@@ -3569,8 +3578,8 @@
         </p:nvSpPr>
         <p:spPr>
           <a:xfrm>
-            <a:off x="2330467" y="3707583"/>
-            <a:ext cx="1143326" cy="369332"/>
+            <a:off x="960120" y="2564262"/>
+            <a:ext cx="1097280" cy="261610"/>
           </a:xfrm>
           <a:prstGeom prst="rect">
             <a:avLst/>
@@ -3578,18 +3587,21 @@
           <a:noFill/>
         </p:spPr>
         <p:txBody>
-          <a:bodyPr wrap="none" rtlCol="0">
+          <a:bodyPr wrap="square" rtlCol="0">
             <a:spAutoFit/>
           </a:bodyPr>
           <a:lstStyle/>
           <a:p>
             <a:pPr algn="ctr"/>
             <a:r>
-              <a:rPr lang="en-US" sz="1400" dirty="0"/>
-              <a:t>ECR Registry</a:t>
-            </a:r>
-            <a:r>
-              <a:rPr lang="en-US" dirty="0"/>
+              <a:rPr lang="en-US" sz="1100" dirty="0">
+                <a:latin typeface="Arial" panose="020B0604020202020204" pitchFamily="34" charset="0"/>
+                <a:cs typeface="Arial" panose="020B0604020202020204" pitchFamily="34" charset="0"/>
+              </a:rPr>
+              <a:t>Amazon ECR registry</a:t>
+            </a:r>
+            <a:r>
+              <a:rPr lang="en-US" sz="1100" dirty="0"/>
               <a:t> </a:t>
             </a:r>
           </a:p>
@@ -3609,8 +3621,8 @@
         </p:nvSpPr>
         <p:spPr>
           <a:xfrm>
-            <a:off x="4716806" y="3707583"/>
-            <a:ext cx="1160895" cy="523220"/>
+            <a:off x="2104732" y="2560320"/>
+            <a:ext cx="954107" cy="430887"/>
           </a:xfrm>
           <a:prstGeom prst="rect">
             <a:avLst/>
@@ -3625,7 +3637,7 @@
           <a:p>
             <a:pPr algn="ctr"/>
             <a:r>
-              <a:rPr lang="en-US" altLang="en-US" sz="1400" dirty="0" err="1">
+              <a:rPr lang="en-US" altLang="en-US" sz="1100" dirty="0">
                 <a:latin typeface="Arial" panose="020B0604020202020204" pitchFamily="34" charset="0"/>
                 <a:ea typeface="Amazon Ember" panose="020B0603020204020204" pitchFamily="34" charset="0"/>
                 <a:cs typeface="Arial" panose="020B0604020202020204" pitchFamily="34" charset="0"/>
@@ -3633,21 +3645,21 @@
               <a:t>EventBridge</a:t>
             </a:r>
             <a:br>
-              <a:rPr lang="en-US" altLang="en-US" sz="1400" dirty="0">
+              <a:rPr lang="en-US" altLang="en-US" sz="1100" dirty="0">
                 <a:latin typeface="Arial" panose="020B0604020202020204" pitchFamily="34" charset="0"/>
                 <a:ea typeface="Amazon Ember" panose="020B0603020204020204" pitchFamily="34" charset="0"/>
                 <a:cs typeface="Arial" panose="020B0604020202020204" pitchFamily="34" charset="0"/>
               </a:rPr>
             </a:br>
             <a:r>
-              <a:rPr lang="en-US" altLang="en-US" sz="1400" dirty="0">
+              <a:rPr lang="en-US" altLang="en-US" sz="1100" dirty="0">
                 <a:latin typeface="Arial" panose="020B0604020202020204" pitchFamily="34" charset="0"/>
                 <a:ea typeface="Amazon Ember" panose="020B0603020204020204" pitchFamily="34" charset="0"/>
                 <a:cs typeface="Arial" panose="020B0604020202020204" pitchFamily="34" charset="0"/>
               </a:rPr>
-              <a:t>Rule</a:t>
-            </a:r>
-            <a:endParaRPr lang="en-US" sz="1400" dirty="0"/>
+              <a:t>rule</a:t>
+            </a:r>
+            <a:endParaRPr lang="en-US" sz="1100" dirty="0"/>
           </a:p>
         </p:txBody>
       </p:sp>
@@ -3665,8 +3677,8 @@
         </p:nvSpPr>
         <p:spPr>
           <a:xfrm>
-            <a:off x="6836870" y="3707583"/>
-            <a:ext cx="782265" cy="307777"/>
+            <a:off x="3249452" y="2560320"/>
+            <a:ext cx="880369" cy="261610"/>
           </a:xfrm>
           <a:prstGeom prst="rect">
             <a:avLst/>
@@ -3681,8 +3693,11 @@
           <a:p>
             <a:pPr algn="ctr"/>
             <a:r>
-              <a:rPr lang="en-US" sz="1400" dirty="0"/>
-              <a:t>Filtering</a:t>
+              <a:rPr lang="en-US" sz="1100" dirty="0">
+                <a:latin typeface="Arial" panose="020B0604020202020204" pitchFamily="34" charset="0"/>
+                <a:cs typeface="Arial" panose="020B0604020202020204" pitchFamily="34" charset="0"/>
+              </a:rPr>
+              <a:t>Image filter</a:t>
             </a:r>
           </a:p>
         </p:txBody>
@@ -3701,8 +3716,8 @@
         </p:nvSpPr>
         <p:spPr>
           <a:xfrm>
-            <a:off x="8265836" y="3707583"/>
-            <a:ext cx="1867819" cy="307777"/>
+            <a:off x="4050792" y="2560320"/>
+            <a:ext cx="1463040" cy="261610"/>
           </a:xfrm>
           <a:prstGeom prst="rect">
             <a:avLst/>
@@ -3717,8 +3732,11 @@
           <a:p>
             <a:pPr algn="ctr"/>
             <a:r>
-              <a:rPr lang="en-US" sz="1400" dirty="0"/>
-              <a:t>SOCI Index Generator</a:t>
+              <a:rPr lang="en-US" sz="1100" dirty="0">
+                <a:latin typeface="Arial" panose="020B0604020202020204" pitchFamily="34" charset="0"/>
+                <a:cs typeface="Arial" panose="020B0604020202020204" pitchFamily="34" charset="0"/>
+              </a:rPr>
+              <a:t>SOCI Index generator</a:t>
             </a:r>
           </a:p>
         </p:txBody>
@@ -3734,19 +3752,17 @@
           </p:cNvPr>
           <p:cNvCxnSpPr>
             <a:cxnSpLocks/>
-            <a:stCxn id="40" idx="2"/>
-            <a:endCxn id="37" idx="2"/>
           </p:cNvCxnSpPr>
           <p:nvPr/>
         </p:nvCxnSpPr>
         <p:spPr>
-          <a:xfrm rot="5400000">
-            <a:off x="6020161" y="897329"/>
-            <a:ext cx="61555" cy="6297616"/>
+          <a:xfrm rot="5400000" flipH="1">
+            <a:off x="3123137" y="1325880"/>
+            <a:ext cx="18732" cy="3291840"/>
           </a:xfrm>
           <a:prstGeom prst="bentConnector3">
             <a:avLst>
-              <a:gd name="adj1" fmla="val 471375"/>
+              <a:gd name="adj1" fmla="val -1220372"/>
             </a:avLst>
           </a:prstGeom>
           <a:ln w="12700">
@@ -3774,6 +3790,501 @@
       </p:cxnSp>
       <p:sp>
         <p:nvSpPr>
+          <p:cNvPr id="6" name="Rectangle 5">
+            <a:extLst>
+              <a:ext uri="{FF2B5EF4-FFF2-40B4-BE49-F238E27FC236}">
+                <a16:creationId xmlns:a16="http://schemas.microsoft.com/office/drawing/2014/main" id="{CCD96DA4-C757-A5CD-B956-7797F5A7C922}"/>
+              </a:ext>
+            </a:extLst>
+          </p:cNvPr>
+          <p:cNvSpPr/>
+          <p:nvPr/>
+        </p:nvSpPr>
+        <p:spPr>
+          <a:xfrm>
+            <a:off x="2053590" y="923307"/>
+            <a:ext cx="3931920" cy="2560320"/>
+          </a:xfrm>
+          <a:prstGeom prst="rect">
+            <a:avLst/>
+          </a:prstGeom>
+          <a:noFill/>
+          <a:ln w="12700">
+            <a:solidFill>
+              <a:srgbClr val="CD2264"/>
+            </a:solidFill>
+          </a:ln>
+        </p:spPr>
+        <p:style>
+          <a:lnRef idx="2">
+            <a:schemeClr val="accent1">
+              <a:shade val="50000"/>
+            </a:schemeClr>
+          </a:lnRef>
+          <a:fillRef idx="1">
+            <a:schemeClr val="accent1"/>
+          </a:fillRef>
+          <a:effectRef idx="0">
+            <a:schemeClr val="accent1"/>
+          </a:effectRef>
+          <a:fontRef idx="minor">
+            <a:schemeClr val="lt1"/>
+          </a:fontRef>
+        </p:style>
+        <p:txBody>
+          <a:bodyPr lIns="502920" tIns="91440"/>
+          <a:lstStyle/>
+          <a:p>
+            <a:pPr eaLnBrk="1" fontAlgn="auto" hangingPunct="1">
+              <a:spcBef>
+                <a:spcPts val="0"/>
+              </a:spcBef>
+              <a:spcAft>
+                <a:spcPts val="0"/>
+              </a:spcAft>
+              <a:defRPr/>
+            </a:pPr>
+            <a:r>
+              <a:rPr lang="en-US" sz="1200" dirty="0">
+                <a:solidFill>
+                  <a:srgbClr val="CD2264"/>
+                </a:solidFill>
+                <a:latin typeface="Arial" panose="020B0604020202020204" pitchFamily="34" charset="0"/>
+                <a:cs typeface="Arial" panose="020B0604020202020204" pitchFamily="34" charset="0"/>
+              </a:rPr>
+              <a:t>AWS CloudFormation stack</a:t>
+            </a:r>
+          </a:p>
+        </p:txBody>
+      </p:sp>
+      <p:pic>
+        <p:nvPicPr>
+          <p:cNvPr id="7" name="Graphic 6">
+            <a:extLst>
+              <a:ext uri="{FF2B5EF4-FFF2-40B4-BE49-F238E27FC236}">
+                <a16:creationId xmlns:a16="http://schemas.microsoft.com/office/drawing/2014/main" id="{AA7102E9-D9ED-5083-F5A2-F9BF26896699}"/>
+              </a:ext>
+            </a:extLst>
+          </p:cNvPr>
+          <p:cNvPicPr>
+            <a:picLocks noChangeAspect="1"/>
+          </p:cNvPicPr>
+          <p:nvPr/>
+        </p:nvPicPr>
+        <p:blipFill>
+          <a:blip r:embed="rId4">
+            <a:extLst>
+              <a:ext uri="{96DAC541-7B7A-43D3-8B79-37D633B846F1}">
+                <asvg:svgBlip xmlns:asvg="http://schemas.microsoft.com/office/drawing/2016/SVG/main" r:embed="rId5"/>
+              </a:ext>
+            </a:extLst>
+          </a:blip>
+          <a:srcRect/>
+          <a:stretch/>
+        </p:blipFill>
+        <p:spPr>
+          <a:xfrm>
+            <a:off x="2053590" y="923307"/>
+            <a:ext cx="381000" cy="381000"/>
+          </a:xfrm>
+          <a:prstGeom prst="rect">
+            <a:avLst/>
+          </a:prstGeom>
+        </p:spPr>
+      </p:pic>
+      <p:pic>
+        <p:nvPicPr>
+          <p:cNvPr id="13" name="Graphic 13">
+            <a:extLst>
+              <a:ext uri="{FF2B5EF4-FFF2-40B4-BE49-F238E27FC236}">
+                <a16:creationId xmlns:a16="http://schemas.microsoft.com/office/drawing/2014/main" id="{2E6EBF8B-C886-4F94-CCBF-4B4921EF098D}"/>
+              </a:ext>
+            </a:extLst>
+          </p:cNvPr>
+          <p:cNvPicPr>
+            <a:picLocks noChangeAspect="1" noChangeArrowheads="1"/>
+          </p:cNvPicPr>
+          <p:nvPr/>
+        </p:nvPicPr>
+        <p:blipFill>
+          <a:blip r:embed="rId6">
+            <a:extLst>
+              <a:ext uri="{28A0092B-C50C-407E-A947-70E740481C1C}">
+                <a14:useLocalDpi xmlns:a14="http://schemas.microsoft.com/office/drawing/2010/main" val="0"/>
+              </a:ext>
+            </a:extLst>
+          </a:blip>
+          <a:srcRect/>
+          <a:stretch>
+            <a:fillRect/>
+          </a:stretch>
+        </p:blipFill>
+        <p:spPr bwMode="auto">
+          <a:xfrm>
+            <a:off x="3456432" y="2139696"/>
+            <a:ext cx="457200" cy="457200"/>
+          </a:xfrm>
+          <a:prstGeom prst="rect">
+            <a:avLst/>
+          </a:prstGeom>
+          <a:noFill/>
+          <a:ln>
+            <a:noFill/>
+          </a:ln>
+          <a:extLst>
+            <a:ext uri="{909E8E84-426E-40DD-AFC4-6F175D3DCCD1}">
+              <a14:hiddenFill xmlns:a14="http://schemas.microsoft.com/office/drawing/2010/main">
+                <a:solidFill>
+                  <a:srgbClr val="FFFFFF"/>
+                </a:solidFill>
+              </a14:hiddenFill>
+            </a:ext>
+            <a:ext uri="{91240B29-F687-4F45-9708-019B960494DF}">
+              <a14:hiddenLine xmlns:a14="http://schemas.microsoft.com/office/drawing/2010/main" w="9525">
+                <a:solidFill>
+                  <a:srgbClr val="000000"/>
+                </a:solidFill>
+                <a:miter lim="800000"/>
+                <a:headEnd/>
+                <a:tailEnd/>
+              </a14:hiddenLine>
+            </a:ext>
+          </a:extLst>
+        </p:spPr>
+      </p:pic>
+      <p:pic>
+        <p:nvPicPr>
+          <p:cNvPr id="19" name="Graphic 13">
+            <a:extLst>
+              <a:ext uri="{FF2B5EF4-FFF2-40B4-BE49-F238E27FC236}">
+                <a16:creationId xmlns:a16="http://schemas.microsoft.com/office/drawing/2014/main" id="{28C2BB6B-3911-B5DD-25B3-5DBF0C248BFA}"/>
+              </a:ext>
+            </a:extLst>
+          </p:cNvPr>
+          <p:cNvPicPr>
+            <a:picLocks noChangeAspect="1" noChangeArrowheads="1"/>
+          </p:cNvPicPr>
+          <p:nvPr/>
+        </p:nvPicPr>
+        <p:blipFill>
+          <a:blip r:embed="rId6">
+            <a:extLst>
+              <a:ext uri="{28A0092B-C50C-407E-A947-70E740481C1C}">
+                <a14:useLocalDpi xmlns:a14="http://schemas.microsoft.com/office/drawing/2010/main" val="0"/>
+              </a:ext>
+            </a:extLst>
+          </a:blip>
+          <a:srcRect/>
+          <a:stretch>
+            <a:fillRect/>
+          </a:stretch>
+        </p:blipFill>
+        <p:spPr bwMode="auto">
+          <a:xfrm>
+            <a:off x="4553712" y="2139696"/>
+            <a:ext cx="457200" cy="457200"/>
+          </a:xfrm>
+          <a:prstGeom prst="rect">
+            <a:avLst/>
+          </a:prstGeom>
+          <a:noFill/>
+          <a:ln>
+            <a:noFill/>
+          </a:ln>
+          <a:extLst>
+            <a:ext uri="{909E8E84-426E-40DD-AFC4-6F175D3DCCD1}">
+              <a14:hiddenFill xmlns:a14="http://schemas.microsoft.com/office/drawing/2010/main">
+                <a:solidFill>
+                  <a:srgbClr val="FFFFFF"/>
+                </a:solidFill>
+              </a14:hiddenFill>
+            </a:ext>
+            <a:ext uri="{91240B29-F687-4F45-9708-019B960494DF}">
+              <a14:hiddenLine xmlns:a14="http://schemas.microsoft.com/office/drawing/2010/main" w="9525">
+                <a:solidFill>
+                  <a:srgbClr val="000000"/>
+                </a:solidFill>
+                <a:miter lim="800000"/>
+                <a:headEnd/>
+                <a:tailEnd/>
+              </a14:hiddenLine>
+            </a:ext>
+          </a:extLst>
+        </p:spPr>
+      </p:pic>
+      <p:pic>
+        <p:nvPicPr>
+          <p:cNvPr id="20" name="Graphic 24">
+            <a:extLst>
+              <a:ext uri="{FF2B5EF4-FFF2-40B4-BE49-F238E27FC236}">
+                <a16:creationId xmlns:a16="http://schemas.microsoft.com/office/drawing/2014/main" id="{AA97E864-F277-0E5B-C8C8-F2B4AEB27740}"/>
+              </a:ext>
+            </a:extLst>
+          </p:cNvPr>
+          <p:cNvPicPr>
+            <a:picLocks noChangeAspect="1" noChangeArrowheads="1"/>
+          </p:cNvPicPr>
+          <p:nvPr/>
+        </p:nvPicPr>
+        <p:blipFill>
+          <a:blip r:embed="rId7">
+            <a:extLst>
+              <a:ext uri="{28A0092B-C50C-407E-A947-70E740481C1C}">
+                <a14:useLocalDpi xmlns:a14="http://schemas.microsoft.com/office/drawing/2010/main" val="0"/>
+              </a:ext>
+            </a:extLst>
+          </a:blip>
+          <a:srcRect/>
+          <a:stretch>
+            <a:fillRect/>
+          </a:stretch>
+        </p:blipFill>
+        <p:spPr bwMode="auto">
+          <a:xfrm>
+            <a:off x="2359152" y="2139696"/>
+            <a:ext cx="457200" cy="457200"/>
+          </a:xfrm>
+          <a:prstGeom prst="rect">
+            <a:avLst/>
+          </a:prstGeom>
+          <a:noFill/>
+          <a:ln>
+            <a:noFill/>
+          </a:ln>
+          <a:extLst>
+            <a:ext uri="{909E8E84-426E-40DD-AFC4-6F175D3DCCD1}">
+              <a14:hiddenFill xmlns:a14="http://schemas.microsoft.com/office/drawing/2010/main">
+                <a:solidFill>
+                  <a:srgbClr val="FFFFFF"/>
+                </a:solidFill>
+              </a14:hiddenFill>
+            </a:ext>
+            <a:ext uri="{91240B29-F687-4F45-9708-019B960494DF}">
+              <a14:hiddenLine xmlns:a14="http://schemas.microsoft.com/office/drawing/2010/main" w="9525">
+                <a:solidFill>
+                  <a:srgbClr val="000000"/>
+                </a:solidFill>
+                <a:miter lim="800000"/>
+                <a:headEnd/>
+                <a:tailEnd/>
+              </a14:hiddenLine>
+            </a:ext>
+          </a:extLst>
+        </p:spPr>
+      </p:pic>
+      <p:cxnSp>
+        <p:nvCxnSpPr>
+          <p:cNvPr id="28" name="Straight Arrow Connector 27">
+            <a:extLst>
+              <a:ext uri="{FF2B5EF4-FFF2-40B4-BE49-F238E27FC236}">
+                <a16:creationId xmlns:a16="http://schemas.microsoft.com/office/drawing/2014/main" id="{4856C472-EF9A-F2F0-114C-3F0F5921E560}"/>
+              </a:ext>
+            </a:extLst>
+          </p:cNvPr>
+          <p:cNvCxnSpPr>
+            <a:cxnSpLocks/>
+            <a:stCxn id="31" idx="3"/>
+            <a:endCxn id="20" idx="1"/>
+          </p:cNvCxnSpPr>
+          <p:nvPr/>
+        </p:nvCxnSpPr>
+        <p:spPr>
+          <a:xfrm flipV="1">
+            <a:off x="1719072" y="2368296"/>
+            <a:ext cx="640080" cy="376"/>
+          </a:xfrm>
+          <a:prstGeom prst="straightConnector1">
+            <a:avLst/>
+          </a:prstGeom>
+          <a:ln w="12700">
+            <a:solidFill>
+              <a:schemeClr val="tx2"/>
+            </a:solidFill>
+            <a:headEnd type="none" w="med" len="sm"/>
+            <a:tailEnd type="arrow" w="med" len="sm"/>
+          </a:ln>
+        </p:spPr>
+        <p:style>
+          <a:lnRef idx="1">
+            <a:schemeClr val="accent1"/>
+          </a:lnRef>
+          <a:fillRef idx="0">
+            <a:schemeClr val="accent1"/>
+          </a:fillRef>
+          <a:effectRef idx="0">
+            <a:schemeClr val="accent1"/>
+          </a:effectRef>
+          <a:fontRef idx="minor">
+            <a:schemeClr val="tx1"/>
+          </a:fontRef>
+        </p:style>
+      </p:cxnSp>
+      <p:pic>
+        <p:nvPicPr>
+          <p:cNvPr id="31" name="Graphic 8">
+            <a:extLst>
+              <a:ext uri="{FF2B5EF4-FFF2-40B4-BE49-F238E27FC236}">
+                <a16:creationId xmlns:a16="http://schemas.microsoft.com/office/drawing/2014/main" id="{FC76B19B-4C98-5B5B-7A88-8BEC87A7FCA2}"/>
+              </a:ext>
+            </a:extLst>
+          </p:cNvPr>
+          <p:cNvPicPr>
+            <a:picLocks noChangeAspect="1" noChangeArrowheads="1"/>
+          </p:cNvPicPr>
+          <p:nvPr/>
+        </p:nvPicPr>
+        <p:blipFill>
+          <a:blip r:embed="rId8">
+            <a:extLst>
+              <a:ext uri="{28A0092B-C50C-407E-A947-70E740481C1C}">
+                <a14:useLocalDpi xmlns:a14="http://schemas.microsoft.com/office/drawing/2010/main" val="0"/>
+              </a:ext>
+            </a:extLst>
+          </a:blip>
+          <a:srcRect/>
+          <a:stretch>
+            <a:fillRect/>
+          </a:stretch>
+        </p:blipFill>
+        <p:spPr bwMode="auto">
+          <a:xfrm>
+            <a:off x="1261872" y="2140072"/>
+            <a:ext cx="457200" cy="457200"/>
+          </a:xfrm>
+          <a:prstGeom prst="rect">
+            <a:avLst/>
+          </a:prstGeom>
+          <a:noFill/>
+          <a:ln>
+            <a:noFill/>
+          </a:ln>
+          <a:extLst>
+            <a:ext uri="{909E8E84-426E-40DD-AFC4-6F175D3DCCD1}">
+              <a14:hiddenFill xmlns:a14="http://schemas.microsoft.com/office/drawing/2010/main">
+                <a:solidFill>
+                  <a:srgbClr val="FFFFFF"/>
+                </a:solidFill>
+              </a14:hiddenFill>
+            </a:ext>
+            <a:ext uri="{91240B29-F687-4F45-9708-019B960494DF}">
+              <a14:hiddenLine xmlns:a14="http://schemas.microsoft.com/office/drawing/2010/main" w="9525">
+                <a:solidFill>
+                  <a:srgbClr val="000000"/>
+                </a:solidFill>
+                <a:miter lim="800000"/>
+                <a:headEnd/>
+                <a:tailEnd/>
+              </a14:hiddenLine>
+            </a:ext>
+          </a:extLst>
+        </p:spPr>
+      </p:pic>
+      <p:sp>
+        <p:nvSpPr>
+          <p:cNvPr id="35" name="Rectangle 34">
+            <a:extLst>
+              <a:ext uri="{FF2B5EF4-FFF2-40B4-BE49-F238E27FC236}">
+                <a16:creationId xmlns:a16="http://schemas.microsoft.com/office/drawing/2014/main" id="{92DD75F9-0B70-2D16-EAC5-4C59FB64BDF7}"/>
+              </a:ext>
+            </a:extLst>
+          </p:cNvPr>
+          <p:cNvSpPr/>
+          <p:nvPr/>
+        </p:nvSpPr>
+        <p:spPr>
+          <a:xfrm>
+            <a:off x="914400" y="362746"/>
+            <a:ext cx="6766560" cy="3474720"/>
+          </a:xfrm>
+          <a:prstGeom prst="rect">
+            <a:avLst/>
+          </a:prstGeom>
+          <a:noFill/>
+          <a:ln w="12700">
+            <a:solidFill>
+              <a:schemeClr val="tx1"/>
+            </a:solidFill>
+          </a:ln>
+        </p:spPr>
+        <p:style>
+          <a:lnRef idx="2">
+            <a:schemeClr val="accent1">
+              <a:shade val="50000"/>
+            </a:schemeClr>
+          </a:lnRef>
+          <a:fillRef idx="1">
+            <a:schemeClr val="accent1"/>
+          </a:fillRef>
+          <a:effectRef idx="0">
+            <a:schemeClr val="accent1"/>
+          </a:effectRef>
+          <a:fontRef idx="minor">
+            <a:schemeClr val="lt1"/>
+          </a:fontRef>
+        </p:style>
+        <p:txBody>
+          <a:bodyPr lIns="502920" tIns="91440"/>
+          <a:lstStyle/>
+          <a:p>
+            <a:pPr eaLnBrk="1" fontAlgn="auto" hangingPunct="1">
+              <a:spcBef>
+                <a:spcPts val="0"/>
+              </a:spcBef>
+              <a:spcAft>
+                <a:spcPts val="0"/>
+              </a:spcAft>
+              <a:defRPr/>
+            </a:pPr>
+            <a:r>
+              <a:rPr lang="en-US" sz="1200" dirty="0">
+                <a:solidFill>
+                  <a:sysClr val="windowText" lastClr="000000"/>
+                </a:solidFill>
+                <a:latin typeface="Arial" panose="020B0604020202020204" pitchFamily="34" charset="0"/>
+                <a:cs typeface="Arial" panose="020B0604020202020204" pitchFamily="34" charset="0"/>
+              </a:rPr>
+              <a:t>AWS Cloud</a:t>
+            </a:r>
+          </a:p>
+        </p:txBody>
+      </p:sp>
+      <p:pic>
+        <p:nvPicPr>
+          <p:cNvPr id="42" name="Graphic 41">
+            <a:extLst>
+              <a:ext uri="{FF2B5EF4-FFF2-40B4-BE49-F238E27FC236}">
+                <a16:creationId xmlns:a16="http://schemas.microsoft.com/office/drawing/2014/main" id="{8D2E21B8-C0F6-D51B-8C1C-D5912D72E58A}"/>
+              </a:ext>
+            </a:extLst>
+          </p:cNvPr>
+          <p:cNvPicPr>
+            <a:picLocks noChangeAspect="1"/>
+          </p:cNvPicPr>
+          <p:nvPr/>
+        </p:nvPicPr>
+        <p:blipFill>
+          <a:blip r:embed="rId9">
+            <a:extLst>
+              <a:ext uri="{96DAC541-7B7A-43D3-8B79-37D633B846F1}">
+                <asvg:svgBlip xmlns:asvg="http://schemas.microsoft.com/office/drawing/2016/SVG/main" r:embed="rId10"/>
+              </a:ext>
+            </a:extLst>
+          </a:blip>
+          <a:srcRect/>
+          <a:stretch/>
+        </p:blipFill>
+        <p:spPr>
+          <a:xfrm>
+            <a:off x="914400" y="368743"/>
+            <a:ext cx="381000" cy="381000"/>
+          </a:xfrm>
+          <a:prstGeom prst="rect">
+            <a:avLst/>
+          </a:prstGeom>
+        </p:spPr>
+      </p:pic>
+      <p:sp>
+        <p:nvSpPr>
           <p:cNvPr id="3" name="TextBox 9">
             <a:extLst>
               <a:ext uri="{FF2B5EF4-FFF2-40B4-BE49-F238E27FC236}">
@@ -3788,8 +4299,8 @@
         </p:nvSpPr>
         <p:spPr bwMode="auto">
           <a:xfrm>
-            <a:off x="1617693" y="2446295"/>
-            <a:ext cx="2243137" cy="276999"/>
+            <a:off x="5985510" y="1783080"/>
+            <a:ext cx="1645920" cy="276999"/>
           </a:xfrm>
           <a:prstGeom prst="rect">
             <a:avLst/>
@@ -3933,116 +4444,12 @@
           </a:p>
         </p:txBody>
       </p:sp>
-      <p:sp>
-        <p:nvSpPr>
-          <p:cNvPr id="6" name="Rectangle 5">
-            <a:extLst>
-              <a:ext uri="{FF2B5EF4-FFF2-40B4-BE49-F238E27FC236}">
-                <a16:creationId xmlns:a16="http://schemas.microsoft.com/office/drawing/2014/main" id="{CCD96DA4-C757-A5CD-B956-7797F5A7C922}"/>
-              </a:ext>
-            </a:extLst>
-          </p:cNvPr>
-          <p:cNvSpPr/>
-          <p:nvPr/>
-        </p:nvSpPr>
-        <p:spPr>
-          <a:xfrm>
-            <a:off x="3680014" y="1366678"/>
-            <a:ext cx="6554195" cy="3538885"/>
-          </a:xfrm>
-          <a:prstGeom prst="rect">
-            <a:avLst/>
-          </a:prstGeom>
-          <a:noFill/>
-          <a:ln w="12700">
-            <a:solidFill>
-              <a:srgbClr val="CD2264"/>
-            </a:solidFill>
-          </a:ln>
-        </p:spPr>
-        <p:style>
-          <a:lnRef idx="2">
-            <a:schemeClr val="accent1">
-              <a:shade val="50000"/>
-            </a:schemeClr>
-          </a:lnRef>
-          <a:fillRef idx="1">
-            <a:schemeClr val="accent1"/>
-          </a:fillRef>
-          <a:effectRef idx="0">
-            <a:schemeClr val="accent1"/>
-          </a:effectRef>
-          <a:fontRef idx="minor">
-            <a:schemeClr val="lt1"/>
-          </a:fontRef>
-        </p:style>
-        <p:txBody>
-          <a:bodyPr lIns="502920" tIns="91440"/>
-          <a:lstStyle/>
-          <a:p>
-            <a:pPr eaLnBrk="1" fontAlgn="auto" hangingPunct="1">
-              <a:spcBef>
-                <a:spcPts val="0"/>
-              </a:spcBef>
-              <a:spcAft>
-                <a:spcPts val="0"/>
-              </a:spcAft>
-              <a:defRPr/>
-            </a:pPr>
-            <a:r>
-              <a:rPr lang="en-US" sz="1200" dirty="0">
-                <a:solidFill>
-                  <a:srgbClr val="CD2264"/>
-                </a:solidFill>
-                <a:latin typeface="Arial" panose="020B0604020202020204" pitchFamily="34" charset="0"/>
-                <a:cs typeface="Arial" panose="020B0604020202020204" pitchFamily="34" charset="0"/>
-              </a:rPr>
-              <a:t>AWS CloudFormation Stack</a:t>
-            </a:r>
-          </a:p>
-        </p:txBody>
-      </p:sp>
       <p:pic>
         <p:nvPicPr>
-          <p:cNvPr id="7" name="Graphic 6">
-            <a:extLst>
-              <a:ext uri="{FF2B5EF4-FFF2-40B4-BE49-F238E27FC236}">
-                <a16:creationId xmlns:a16="http://schemas.microsoft.com/office/drawing/2014/main" id="{AA7102E9-D9ED-5083-F5A2-F9BF26896699}"/>
-              </a:ext>
-            </a:extLst>
-          </p:cNvPr>
-          <p:cNvPicPr>
-            <a:picLocks noChangeAspect="1"/>
-          </p:cNvPicPr>
-          <p:nvPr/>
-        </p:nvPicPr>
-        <p:blipFill>
-          <a:blip r:embed="rId4">
-            <a:extLst>
-              <a:ext uri="{96DAC541-7B7A-43D3-8B79-37D633B846F1}">
-                <asvg:svgBlip xmlns:asvg="http://schemas.microsoft.com/office/drawing/2016/SVG/main" r:embed="rId5"/>
-              </a:ext>
-            </a:extLst>
-          </a:blip>
-          <a:srcRect/>
-          <a:stretch/>
-        </p:blipFill>
-        <p:spPr>
-          <a:xfrm>
-            <a:off x="3680015" y="1366679"/>
-            <a:ext cx="381000" cy="381000"/>
-          </a:xfrm>
-          <a:prstGeom prst="rect">
-            <a:avLst/>
-          </a:prstGeom>
-        </p:spPr>
-      </p:pic>
-      <p:pic>
-        <p:nvPicPr>
-          <p:cNvPr id="13" name="Graphic 13">
-            <a:extLst>
-              <a:ext uri="{FF2B5EF4-FFF2-40B4-BE49-F238E27FC236}">
-                <a16:creationId xmlns:a16="http://schemas.microsoft.com/office/drawing/2014/main" id="{2E6EBF8B-C886-4F94-CCBF-4B4921EF098D}"/>
+          <p:cNvPr id="2" name="Graphic 17">
+            <a:extLst>
+              <a:ext uri="{FF2B5EF4-FFF2-40B4-BE49-F238E27FC236}">
+                <a16:creationId xmlns:a16="http://schemas.microsoft.com/office/drawing/2014/main" id="{7BF5EAC7-4CED-2636-5773-0FF80A559CDA}"/>
               </a:ext>
             </a:extLst>
           </p:cNvPr>
@@ -4052,7 +4459,7 @@
           <p:nvPr/>
         </p:nvPicPr>
         <p:blipFill>
-          <a:blip r:embed="rId6">
+          <a:blip r:embed="rId11">
             <a:extLst>
               <a:ext uri="{28A0092B-C50C-407E-A947-70E740481C1C}">
                 <a14:useLocalDpi xmlns:a14="http://schemas.microsoft.com/office/drawing/2010/main" val="0"/>
@@ -4066,396 +4473,7 @@
         </p:blipFill>
         <p:spPr bwMode="auto">
           <a:xfrm>
-            <a:off x="6999403" y="3224593"/>
-            <a:ext cx="457200" cy="457200"/>
-          </a:xfrm>
-          <a:prstGeom prst="rect">
-            <a:avLst/>
-          </a:prstGeom>
-          <a:noFill/>
-          <a:ln>
-            <a:noFill/>
-          </a:ln>
-          <a:extLst>
-            <a:ext uri="{909E8E84-426E-40DD-AFC4-6F175D3DCCD1}">
-              <a14:hiddenFill xmlns:a14="http://schemas.microsoft.com/office/drawing/2010/main">
-                <a:solidFill>
-                  <a:srgbClr val="FFFFFF"/>
-                </a:solidFill>
-              </a14:hiddenFill>
-            </a:ext>
-            <a:ext uri="{91240B29-F687-4F45-9708-019B960494DF}">
-              <a14:hiddenLine xmlns:a14="http://schemas.microsoft.com/office/drawing/2010/main" w="9525">
-                <a:solidFill>
-                  <a:srgbClr val="000000"/>
-                </a:solidFill>
-                <a:miter lim="800000"/>
-                <a:headEnd/>
-                <a:tailEnd/>
-              </a14:hiddenLine>
-            </a:ext>
-          </a:extLst>
-        </p:spPr>
-      </p:pic>
-      <p:pic>
-        <p:nvPicPr>
-          <p:cNvPr id="19" name="Graphic 13">
-            <a:extLst>
-              <a:ext uri="{FF2B5EF4-FFF2-40B4-BE49-F238E27FC236}">
-                <a16:creationId xmlns:a16="http://schemas.microsoft.com/office/drawing/2014/main" id="{28C2BB6B-3911-B5DD-25B3-5DBF0C248BFA}"/>
-              </a:ext>
-            </a:extLst>
-          </p:cNvPr>
-          <p:cNvPicPr>
-            <a:picLocks noChangeAspect="1" noChangeArrowheads="1"/>
-          </p:cNvPicPr>
-          <p:nvPr/>
-        </p:nvPicPr>
-        <p:blipFill>
-          <a:blip r:embed="rId6">
-            <a:extLst>
-              <a:ext uri="{28A0092B-C50C-407E-A947-70E740481C1C}">
-                <a14:useLocalDpi xmlns:a14="http://schemas.microsoft.com/office/drawing/2010/main" val="0"/>
-              </a:ext>
-            </a:extLst>
-          </a:blip>
-          <a:srcRect/>
-          <a:stretch>
-            <a:fillRect/>
-          </a:stretch>
-        </p:blipFill>
-        <p:spPr bwMode="auto">
-          <a:xfrm>
-            <a:off x="8971145" y="3222164"/>
-            <a:ext cx="457200" cy="457200"/>
-          </a:xfrm>
-          <a:prstGeom prst="rect">
-            <a:avLst/>
-          </a:prstGeom>
-          <a:noFill/>
-          <a:ln>
-            <a:noFill/>
-          </a:ln>
-          <a:extLst>
-            <a:ext uri="{909E8E84-426E-40DD-AFC4-6F175D3DCCD1}">
-              <a14:hiddenFill xmlns:a14="http://schemas.microsoft.com/office/drawing/2010/main">
-                <a:solidFill>
-                  <a:srgbClr val="FFFFFF"/>
-                </a:solidFill>
-              </a14:hiddenFill>
-            </a:ext>
-            <a:ext uri="{91240B29-F687-4F45-9708-019B960494DF}">
-              <a14:hiddenLine xmlns:a14="http://schemas.microsoft.com/office/drawing/2010/main" w="9525">
-                <a:solidFill>
-                  <a:srgbClr val="000000"/>
-                </a:solidFill>
-                <a:miter lim="800000"/>
-                <a:headEnd/>
-                <a:tailEnd/>
-              </a14:hiddenLine>
-            </a:ext>
-          </a:extLst>
-        </p:spPr>
-      </p:pic>
-      <p:pic>
-        <p:nvPicPr>
-          <p:cNvPr id="20" name="Graphic 24">
-            <a:extLst>
-              <a:ext uri="{FF2B5EF4-FFF2-40B4-BE49-F238E27FC236}">
-                <a16:creationId xmlns:a16="http://schemas.microsoft.com/office/drawing/2014/main" id="{AA97E864-F277-0E5B-C8C8-F2B4AEB27740}"/>
-              </a:ext>
-            </a:extLst>
-          </p:cNvPr>
-          <p:cNvPicPr>
-            <a:picLocks noChangeAspect="1" noChangeArrowheads="1"/>
-          </p:cNvPicPr>
-          <p:nvPr/>
-        </p:nvPicPr>
-        <p:blipFill>
-          <a:blip r:embed="rId7">
-            <a:extLst>
-              <a:ext uri="{28A0092B-C50C-407E-A947-70E740481C1C}">
-                <a14:useLocalDpi xmlns:a14="http://schemas.microsoft.com/office/drawing/2010/main" val="0"/>
-              </a:ext>
-            </a:extLst>
-          </a:blip>
-          <a:srcRect/>
-          <a:stretch>
-            <a:fillRect/>
-          </a:stretch>
-        </p:blipFill>
-        <p:spPr bwMode="auto">
-          <a:xfrm>
-            <a:off x="5068653" y="3228445"/>
-            <a:ext cx="457200" cy="457200"/>
-          </a:xfrm>
-          <a:prstGeom prst="rect">
-            <a:avLst/>
-          </a:prstGeom>
-          <a:noFill/>
-          <a:ln>
-            <a:noFill/>
-          </a:ln>
-          <a:extLst>
-            <a:ext uri="{909E8E84-426E-40DD-AFC4-6F175D3DCCD1}">
-              <a14:hiddenFill xmlns:a14="http://schemas.microsoft.com/office/drawing/2010/main">
-                <a:solidFill>
-                  <a:srgbClr val="FFFFFF"/>
-                </a:solidFill>
-              </a14:hiddenFill>
-            </a:ext>
-            <a:ext uri="{91240B29-F687-4F45-9708-019B960494DF}">
-              <a14:hiddenLine xmlns:a14="http://schemas.microsoft.com/office/drawing/2010/main" w="9525">
-                <a:solidFill>
-                  <a:srgbClr val="000000"/>
-                </a:solidFill>
-                <a:miter lim="800000"/>
-                <a:headEnd/>
-                <a:tailEnd/>
-              </a14:hiddenLine>
-            </a:ext>
-          </a:extLst>
-        </p:spPr>
-      </p:pic>
-      <p:cxnSp>
-        <p:nvCxnSpPr>
-          <p:cNvPr id="28" name="Straight Arrow Connector 27">
-            <a:extLst>
-              <a:ext uri="{FF2B5EF4-FFF2-40B4-BE49-F238E27FC236}">
-                <a16:creationId xmlns:a16="http://schemas.microsoft.com/office/drawing/2014/main" id="{4856C472-EF9A-F2F0-114C-3F0F5921E560}"/>
-              </a:ext>
-            </a:extLst>
-          </p:cNvPr>
-          <p:cNvCxnSpPr>
-            <a:cxnSpLocks/>
-          </p:cNvCxnSpPr>
-          <p:nvPr/>
-        </p:nvCxnSpPr>
-        <p:spPr>
-          <a:xfrm>
-            <a:off x="3348134" y="3439881"/>
-            <a:ext cx="1599674" cy="0"/>
-          </a:xfrm>
-          <a:prstGeom prst="straightConnector1">
-            <a:avLst/>
-          </a:prstGeom>
-          <a:ln w="12700">
-            <a:solidFill>
-              <a:schemeClr val="tx2"/>
-            </a:solidFill>
-            <a:headEnd type="none" w="med" len="sm"/>
-            <a:tailEnd type="arrow" w="med" len="sm"/>
-          </a:ln>
-        </p:spPr>
-        <p:style>
-          <a:lnRef idx="1">
-            <a:schemeClr val="accent1"/>
-          </a:lnRef>
-          <a:fillRef idx="0">
-            <a:schemeClr val="accent1"/>
-          </a:fillRef>
-          <a:effectRef idx="0">
-            <a:schemeClr val="accent1"/>
-          </a:effectRef>
-          <a:fontRef idx="minor">
-            <a:schemeClr val="tx1"/>
-          </a:fontRef>
-        </p:style>
-      </p:cxnSp>
-      <p:pic>
-        <p:nvPicPr>
-          <p:cNvPr id="31" name="Graphic 8">
-            <a:extLst>
-              <a:ext uri="{FF2B5EF4-FFF2-40B4-BE49-F238E27FC236}">
-                <a16:creationId xmlns:a16="http://schemas.microsoft.com/office/drawing/2014/main" id="{FC76B19B-4C98-5B5B-7A88-8BEC87A7FCA2}"/>
-              </a:ext>
-            </a:extLst>
-          </p:cNvPr>
-          <p:cNvPicPr>
-            <a:picLocks noChangeAspect="1" noChangeArrowheads="1"/>
-          </p:cNvPicPr>
-          <p:nvPr/>
-        </p:nvPicPr>
-        <p:blipFill>
-          <a:blip r:embed="rId8">
-            <a:extLst>
-              <a:ext uri="{28A0092B-C50C-407E-A947-70E740481C1C}">
-                <a14:useLocalDpi xmlns:a14="http://schemas.microsoft.com/office/drawing/2010/main" val="0"/>
-              </a:ext>
-            </a:extLst>
-          </a:blip>
-          <a:srcRect/>
-          <a:stretch>
-            <a:fillRect/>
-          </a:stretch>
-        </p:blipFill>
-        <p:spPr bwMode="auto">
-          <a:xfrm>
-            <a:off x="2671875" y="3224534"/>
-            <a:ext cx="457200" cy="457200"/>
-          </a:xfrm>
-          <a:prstGeom prst="rect">
-            <a:avLst/>
-          </a:prstGeom>
-          <a:noFill/>
-          <a:ln>
-            <a:noFill/>
-          </a:ln>
-          <a:extLst>
-            <a:ext uri="{909E8E84-426E-40DD-AFC4-6F175D3DCCD1}">
-              <a14:hiddenFill xmlns:a14="http://schemas.microsoft.com/office/drawing/2010/main">
-                <a:solidFill>
-                  <a:srgbClr val="FFFFFF"/>
-                </a:solidFill>
-              </a14:hiddenFill>
-            </a:ext>
-            <a:ext uri="{91240B29-F687-4F45-9708-019B960494DF}">
-              <a14:hiddenLine xmlns:a14="http://schemas.microsoft.com/office/drawing/2010/main" w="9525">
-                <a:solidFill>
-                  <a:srgbClr val="000000"/>
-                </a:solidFill>
-                <a:miter lim="800000"/>
-                <a:headEnd/>
-                <a:tailEnd/>
-              </a14:hiddenLine>
-            </a:ext>
-          </a:extLst>
-        </p:spPr>
-      </p:pic>
-      <p:sp>
-        <p:nvSpPr>
-          <p:cNvPr id="35" name="Rectangle 34">
-            <a:extLst>
-              <a:ext uri="{FF2B5EF4-FFF2-40B4-BE49-F238E27FC236}">
-                <a16:creationId xmlns:a16="http://schemas.microsoft.com/office/drawing/2014/main" id="{92DD75F9-0B70-2D16-EAC5-4C59FB64BDF7}"/>
-              </a:ext>
-            </a:extLst>
-          </p:cNvPr>
-          <p:cNvSpPr/>
-          <p:nvPr/>
-        </p:nvSpPr>
-        <p:spPr>
-          <a:xfrm>
-            <a:off x="1792058" y="993919"/>
-            <a:ext cx="8747190" cy="4209254"/>
-          </a:xfrm>
-          <a:prstGeom prst="rect">
-            <a:avLst/>
-          </a:prstGeom>
-          <a:noFill/>
-          <a:ln w="12700">
-            <a:solidFill>
-              <a:schemeClr val="tx1"/>
-            </a:solidFill>
-          </a:ln>
-        </p:spPr>
-        <p:style>
-          <a:lnRef idx="2">
-            <a:schemeClr val="accent1">
-              <a:shade val="50000"/>
-            </a:schemeClr>
-          </a:lnRef>
-          <a:fillRef idx="1">
-            <a:schemeClr val="accent1"/>
-          </a:fillRef>
-          <a:effectRef idx="0">
-            <a:schemeClr val="accent1"/>
-          </a:effectRef>
-          <a:fontRef idx="minor">
-            <a:schemeClr val="lt1"/>
-          </a:fontRef>
-        </p:style>
-        <p:txBody>
-          <a:bodyPr lIns="502920" tIns="91440"/>
-          <a:lstStyle/>
-          <a:p>
-            <a:pPr eaLnBrk="1" fontAlgn="auto" hangingPunct="1">
-              <a:spcBef>
-                <a:spcPts val="0"/>
-              </a:spcBef>
-              <a:spcAft>
-                <a:spcPts val="0"/>
-              </a:spcAft>
-              <a:defRPr/>
-            </a:pPr>
-            <a:r>
-              <a:rPr lang="en-US" sz="1200">
-                <a:solidFill>
-                  <a:sysClr val="windowText" lastClr="000000"/>
-                </a:solidFill>
-                <a:latin typeface="Arial" panose="020B0604020202020204" pitchFamily="34" charset="0"/>
-                <a:cs typeface="Arial" panose="020B0604020202020204" pitchFamily="34" charset="0"/>
-              </a:rPr>
-              <a:t>AWS Cloud</a:t>
-            </a:r>
-          </a:p>
-        </p:txBody>
-      </p:sp>
-      <p:pic>
-        <p:nvPicPr>
-          <p:cNvPr id="42" name="Graphic 41">
-            <a:extLst>
-              <a:ext uri="{FF2B5EF4-FFF2-40B4-BE49-F238E27FC236}">
-                <a16:creationId xmlns:a16="http://schemas.microsoft.com/office/drawing/2014/main" id="{8D2E21B8-C0F6-D51B-8C1C-D5912D72E58A}"/>
-              </a:ext>
-            </a:extLst>
-          </p:cNvPr>
-          <p:cNvPicPr>
-            <a:picLocks noChangeAspect="1"/>
-          </p:cNvPicPr>
-          <p:nvPr/>
-        </p:nvPicPr>
-        <p:blipFill>
-          <a:blip r:embed="rId9">
-            <a:extLst>
-              <a:ext uri="{96DAC541-7B7A-43D3-8B79-37D633B846F1}">
-                <asvg:svgBlip xmlns:asvg="http://schemas.microsoft.com/office/drawing/2016/SVG/main" r:embed="rId10"/>
-              </a:ext>
-            </a:extLst>
-          </a:blip>
-          <a:srcRect/>
-          <a:stretch/>
-        </p:blipFill>
-        <p:spPr>
-          <a:xfrm>
-            <a:off x="1792058" y="999916"/>
-            <a:ext cx="381000" cy="381000"/>
-          </a:xfrm>
-          <a:prstGeom prst="rect">
-            <a:avLst/>
-          </a:prstGeom>
-        </p:spPr>
-      </p:pic>
-      <p:pic>
-        <p:nvPicPr>
-          <p:cNvPr id="2" name="Graphic 17">
-            <a:extLst>
-              <a:ext uri="{FF2B5EF4-FFF2-40B4-BE49-F238E27FC236}">
-                <a16:creationId xmlns:a16="http://schemas.microsoft.com/office/drawing/2014/main" id="{7BF5EAC7-4CED-2636-5773-0FF80A559CDA}"/>
-              </a:ext>
-            </a:extLst>
-          </p:cNvPr>
-          <p:cNvPicPr>
-            <a:picLocks noChangeAspect="1" noChangeArrowheads="1"/>
-          </p:cNvPicPr>
-          <p:nvPr/>
-        </p:nvPicPr>
-        <p:blipFill>
-          <a:blip r:embed="rId11">
-            <a:extLst>
-              <a:ext uri="{28A0092B-C50C-407E-A947-70E740481C1C}">
-                <a14:useLocalDpi xmlns:a14="http://schemas.microsoft.com/office/drawing/2010/main" val="0"/>
-              </a:ext>
-            </a:extLst>
-          </a:blip>
-          <a:srcRect/>
-          <a:stretch>
-            <a:fillRect/>
-          </a:stretch>
-        </p:blipFill>
-        <p:spPr bwMode="auto">
-          <a:xfrm>
-            <a:off x="2355036" y="1617647"/>
+            <a:off x="6442710" y="1015865"/>
             <a:ext cx="762000" cy="762000"/>
           </a:xfrm>
           <a:prstGeom prst="rect">
@@ -4515,7 +4533,7 @@
         </p:blipFill>
         <p:spPr bwMode="auto">
           <a:xfrm>
-            <a:off x="8359473" y="1768168"/>
+            <a:off x="5133974" y="1014831"/>
             <a:ext cx="762000" cy="762000"/>
           </a:xfrm>
           <a:prstGeom prst="rect">
@@ -4562,8 +4580,8 @@
         </p:nvSpPr>
         <p:spPr bwMode="auto">
           <a:xfrm>
-            <a:off x="7618905" y="2543676"/>
-            <a:ext cx="2243137" cy="276999"/>
+            <a:off x="5056632" y="1785599"/>
+            <a:ext cx="914400" cy="276999"/>
           </a:xfrm>
           <a:prstGeom prst="rect">
             <a:avLst/>
@@ -4702,7 +4720,7 @@
                 <a:ea typeface="Amazon Ember" panose="020B0603020204020204" pitchFamily="34" charset="0"/>
                 <a:cs typeface="Arial" panose="020B0604020202020204" pitchFamily="34" charset="0"/>
               </a:rPr>
-              <a:t>IAM</a:t>
+              <a:t>AWS IAM</a:t>
             </a:r>
           </a:p>
         </p:txBody>

</xml_diff>